<commit_message>
phrasing changes in slideshow
</commit_message>
<xml_diff>
--- a/ASL translator.pptx
+++ b/ASL translator.pptx
@@ -123,6 +123,96 @@
 </p:presentation>
 </file>
 
+<file path=ppt/revisionInfo.xml><?xml version="1.0" encoding="utf-8"?>
+<p1510:revInfo xmlns:a="http://schemas.openxmlformats.org/drawingml/2006/main" xmlns:r="http://schemas.openxmlformats.org/officeDocument/2006/relationships" xmlns:p1510="http://schemas.microsoft.com/office/powerpoint/2015/10/main">
+  <p1510:revLst>
+    <p1510:client id="{7DBB0D16-88A8-4BB6-9FBE-8CE2045A3E81}" v="19" dt="2025-09-14T12:27:28.970"/>
+  </p1510:revLst>
+</p1510:revInfo>
+</file>
+
+<file path=ppt/changesInfos/changesInfo1.xml><?xml version="1.0" encoding="utf-8"?>
+<pc:chgInfo xmlns:a="http://schemas.openxmlformats.org/drawingml/2006/main" xmlns:r="http://schemas.openxmlformats.org/officeDocument/2006/relationships" xmlns:ac="http://schemas.microsoft.com/office/drawing/2013/main/command" xmlns:pc="http://schemas.microsoft.com/office/powerpoint/2013/main/command">
+  <pc:docChgLst>
+    <pc:chgData name="naomi green" userId="1bbda6d96a239d9d" providerId="LiveId" clId="{0D00D021-5747-4DB4-935B-6DE9882AC9F8}"/>
+    <pc:docChg chg="undo redo custSel modSld">
+      <pc:chgData name="naomi green" userId="1bbda6d96a239d9d" providerId="LiveId" clId="{0D00D021-5747-4DB4-935B-6DE9882AC9F8}" dt="2025-09-14T12:27:28.970" v="326"/>
+      <pc:docMkLst>
+        <pc:docMk/>
+      </pc:docMkLst>
+      <pc:sldChg chg="modSp mod">
+        <pc:chgData name="naomi green" userId="1bbda6d96a239d9d" providerId="LiveId" clId="{0D00D021-5747-4DB4-935B-6DE9882AC9F8}" dt="2025-09-14T12:13:27.506" v="4" actId="5793"/>
+        <pc:sldMkLst>
+          <pc:docMk/>
+          <pc:sldMk cId="1506242954" sldId="256"/>
+        </pc:sldMkLst>
+        <pc:spChg chg="mod">
+          <ac:chgData name="naomi green" userId="1bbda6d96a239d9d" providerId="LiveId" clId="{0D00D021-5747-4DB4-935B-6DE9882AC9F8}" dt="2025-09-14T12:13:27.506" v="4" actId="5793"/>
+          <ac:spMkLst>
+            <pc:docMk/>
+            <pc:sldMk cId="1506242954" sldId="256"/>
+            <ac:spMk id="3" creationId="{694C5E61-EC08-0EF9-C65B-4AD0C42F765B}"/>
+          </ac:spMkLst>
+        </pc:spChg>
+      </pc:sldChg>
+      <pc:sldChg chg="modSp mod">
+        <pc:chgData name="naomi green" userId="1bbda6d96a239d9d" providerId="LiveId" clId="{0D00D021-5747-4DB4-935B-6DE9882AC9F8}" dt="2025-09-14T12:17:16.023" v="23" actId="108"/>
+        <pc:sldMkLst>
+          <pc:docMk/>
+          <pc:sldMk cId="0" sldId="258"/>
+        </pc:sldMkLst>
+        <pc:graphicFrameChg chg="mod modGraphic">
+          <ac:chgData name="naomi green" userId="1bbda6d96a239d9d" providerId="LiveId" clId="{0D00D021-5747-4DB4-935B-6DE9882AC9F8}" dt="2025-09-14T12:17:16.023" v="23" actId="108"/>
+          <ac:graphicFrameMkLst>
+            <pc:docMk/>
+            <pc:sldMk cId="0" sldId="258"/>
+            <ac:graphicFrameMk id="15" creationId="{F14E21DF-0045-A50E-2500-438E53C68A24}"/>
+          </ac:graphicFrameMkLst>
+        </pc:graphicFrameChg>
+      </pc:sldChg>
+      <pc:sldChg chg="modSp mod">
+        <pc:chgData name="naomi green" userId="1bbda6d96a239d9d" providerId="LiveId" clId="{0D00D021-5747-4DB4-935B-6DE9882AC9F8}" dt="2025-09-14T12:23:54.431" v="208" actId="20577"/>
+        <pc:sldMkLst>
+          <pc:docMk/>
+          <pc:sldMk cId="0" sldId="259"/>
+        </pc:sldMkLst>
+        <pc:spChg chg="mod">
+          <ac:chgData name="naomi green" userId="1bbda6d96a239d9d" providerId="LiveId" clId="{0D00D021-5747-4DB4-935B-6DE9882AC9F8}" dt="2025-09-14T12:23:54.431" v="208" actId="20577"/>
+          <ac:spMkLst>
+            <pc:docMk/>
+            <pc:sldMk cId="0" sldId="259"/>
+            <ac:spMk id="3" creationId="{00000000-0000-0000-0000-000000000000}"/>
+          </ac:spMkLst>
+        </pc:spChg>
+        <pc:graphicFrameChg chg="mod">
+          <ac:chgData name="naomi green" userId="1bbda6d96a239d9d" providerId="LiveId" clId="{0D00D021-5747-4DB4-935B-6DE9882AC9F8}" dt="2025-09-14T12:21:27.915" v="110" actId="1076"/>
+          <ac:graphicFrameMkLst>
+            <pc:docMk/>
+            <pc:sldMk cId="0" sldId="259"/>
+            <ac:graphicFrameMk id="4" creationId="{F1A59B18-4E85-1C39-08FF-F40A7B103C97}"/>
+          </ac:graphicFrameMkLst>
+        </pc:graphicFrameChg>
+      </pc:sldChg>
+      <pc:sldChg chg="modSp mod">
+        <pc:chgData name="naomi green" userId="1bbda6d96a239d9d" providerId="LiveId" clId="{0D00D021-5747-4DB4-935B-6DE9882AC9F8}" dt="2025-09-14T12:27:28.970" v="326"/>
+        <pc:sldMkLst>
+          <pc:docMk/>
+          <pc:sldMk cId="1474351204" sldId="270"/>
+        </pc:sldMkLst>
+        <pc:spChg chg="mod">
+          <ac:chgData name="naomi green" userId="1bbda6d96a239d9d" providerId="LiveId" clId="{0D00D021-5747-4DB4-935B-6DE9882AC9F8}" dt="2025-09-14T12:27:28.970" v="326"/>
+          <ac:spMkLst>
+            <pc:docMk/>
+            <pc:sldMk cId="1474351204" sldId="270"/>
+            <ac:spMk id="3" creationId="{FCE080F2-6C5D-2677-E005-EC748AC86BEB}"/>
+          </ac:spMkLst>
+        </pc:spChg>
+      </pc:sldChg>
+    </pc:docChg>
+  </pc:docChgLst>
+</pc:chgInfo>
+</file>
+
 <file path=ppt/diagrams/colors1.xml><?xml version="1.0" encoding="utf-8"?>
 <dgm:colorsDef xmlns:dgm="http://schemas.openxmlformats.org/drawingml/2006/diagram" xmlns:a="http://schemas.openxmlformats.org/drawingml/2006/main" uniqueId="urn:microsoft.com/office/officeart/2005/8/colors/colorful2">
   <dgm:title val=""/>
@@ -1656,7 +1746,7 @@
 <dgm:dataModel xmlns:dgm="http://schemas.openxmlformats.org/drawingml/2006/diagram" xmlns:a="http://schemas.openxmlformats.org/drawingml/2006/main">
   <dgm:ptLst>
     <dgm:pt modelId="{78AB25EA-9C53-4969-9C1B-EAD65FCB2B59}" type="doc">
-      <dgm:prSet loTypeId="urn:microsoft.com/office/officeart/2005/8/layout/vList2" loCatId="list" qsTypeId="urn:microsoft.com/office/officeart/2005/8/quickstyle/simple1" qsCatId="simple" csTypeId="urn:microsoft.com/office/officeart/2005/8/colors/colorful2" csCatId="colorful"/>
+      <dgm:prSet loTypeId="urn:microsoft.com/office/officeart/2005/8/layout/vList2" loCatId="list" qsTypeId="urn:microsoft.com/office/officeart/2005/8/quickstyle/simple1" qsCatId="simple" csTypeId="urn:microsoft.com/office/officeart/2005/8/colors/colorful2" csCatId="colorful" phldr="1"/>
       <dgm:spPr/>
       <dgm:t>
         <a:bodyPr/>
@@ -1674,7 +1764,7 @@
         <a:lstStyle/>
         <a:p>
           <a:r>
-            <a:rPr lang="en-US" sz="2800"/>
+            <a:rPr lang="en-US" sz="2800" dirty="0"/>
             <a:t>Task: Isolated sign (word‑level) classification from video</a:t>
           </a:r>
         </a:p>
@@ -1710,8 +1800,30 @@
         <a:lstStyle/>
         <a:p>
           <a:r>
-            <a:rPr lang="en-US" sz="2800" dirty="0"/>
-            <a:t>Motivation: Help deaf and hearing people alike to learn a language they can share.</a:t>
+            <a:rPr lang="en-US" sz="2800" kern="1200" dirty="0">
+              <a:solidFill>
+                <a:prstClr val="white"/>
+              </a:solidFill>
+              <a:latin typeface="Grandview Display"/>
+              <a:ea typeface="+mn-ea"/>
+              <a:cs typeface="+mn-cs"/>
+            </a:rPr>
+            <a:t>Motivation</a:t>
+          </a:r>
+          <a:r>
+            <a:rPr lang="en-US" sz="2800" b="1" kern="1200" dirty="0"/>
+            <a:t>: </a:t>
+          </a:r>
+          <a:r>
+            <a:rPr lang="en-US" sz="2800" kern="1200" dirty="0">
+              <a:solidFill>
+                <a:prstClr val="white"/>
+              </a:solidFill>
+              <a:latin typeface="Grandview Display"/>
+              <a:ea typeface="+mn-ea"/>
+              <a:cs typeface="+mn-cs"/>
+            </a:rPr>
+            <a:t>Help deaf and hearing people learn a shared, accessible language</a:t>
           </a:r>
         </a:p>
       </dgm:t>
@@ -2171,7 +2283,7 @@
             <a:buNone/>
           </a:pPr>
           <a:r>
-            <a:rPr lang="en-US" sz="2800" kern="1200"/>
+            <a:rPr lang="en-US" sz="2800" kern="1200" dirty="0"/>
             <a:t>Task: Isolated sign (word‑level) classification from video</a:t>
           </a:r>
         </a:p>
@@ -2249,8 +2361,30 @@
             <a:buNone/>
           </a:pPr>
           <a:r>
-            <a:rPr lang="en-US" sz="2800" kern="1200" dirty="0"/>
-            <a:t>Motivation: Help deaf and hearing people alike to learn a language they can share.</a:t>
+            <a:rPr lang="en-US" sz="2800" kern="1200" dirty="0">
+              <a:solidFill>
+                <a:prstClr val="white"/>
+              </a:solidFill>
+              <a:latin typeface="Grandview Display"/>
+              <a:ea typeface="+mn-ea"/>
+              <a:cs typeface="+mn-cs"/>
+            </a:rPr>
+            <a:t>Motivation</a:t>
+          </a:r>
+          <a:r>
+            <a:rPr lang="en-US" sz="2800" b="1" kern="1200" dirty="0"/>
+            <a:t>: </a:t>
+          </a:r>
+          <a:r>
+            <a:rPr lang="en-US" sz="2800" kern="1200" dirty="0">
+              <a:solidFill>
+                <a:prstClr val="white"/>
+              </a:solidFill>
+              <a:latin typeface="Grandview Display"/>
+              <a:ea typeface="+mn-ea"/>
+              <a:cs typeface="+mn-cs"/>
+            </a:rPr>
+            <a:t>Help deaf and hearing people learn a shared, accessible language</a:t>
           </a:r>
         </a:p>
       </dsp:txBody>
@@ -5275,7 +5409,7 @@
           <a:p>
             <a:fld id="{59CA8DA3-5228-4D4C-99C2-0A091FD53B2D}" type="datetimeFigureOut">
               <a:rPr lang="LID4096" smtClean="0"/>
-              <a:t>09/13/2025</a:t>
+              <a:t>09/14/2025</a:t>
             </a:fld>
             <a:endParaRPr lang="LID4096"/>
           </a:p>
@@ -5783,7 +5917,7 @@
           <a:p>
             <a:fld id="{6444479B-705B-4489-957E-7E8A228BDFA0}" type="datetime1">
               <a:rPr lang="en-US" smtClean="0"/>
-              <a:t>9/13/2025</a:t>
+              <a:t>14/9/2025</a:t>
             </a:fld>
             <a:endParaRPr lang="en-US"/>
           </a:p>
@@ -5983,7 +6117,7 @@
           <a:p>
             <a:fld id="{C07B66AD-7C08-490A-ADA4-B47E10FB2407}" type="datetime1">
               <a:rPr lang="en-US" smtClean="0"/>
-              <a:t>9/13/2025</a:t>
+              <a:t>14/9/2025</a:t>
             </a:fld>
             <a:endParaRPr lang="en-US"/>
           </a:p>
@@ -6242,7 +6376,7 @@
           <a:p>
             <a:fld id="{05B95027-4255-49E7-9841-CD21BCC99996}" type="datetime1">
               <a:rPr lang="en-US" smtClean="0"/>
-              <a:t>9/13/2025</a:t>
+              <a:t>14/9/2025</a:t>
             </a:fld>
             <a:endParaRPr lang="en-US"/>
           </a:p>
@@ -6483,7 +6617,7 @@
           <a:p>
             <a:fld id="{9F89F774-3FA6-43B8-9241-99959C8FD463}" type="datetime1">
               <a:rPr lang="en-US" smtClean="0"/>
-              <a:t>9/13/2025</a:t>
+              <a:t>14/9/2025</a:t>
             </a:fld>
             <a:endParaRPr lang="en-US"/>
           </a:p>
@@ -6810,7 +6944,7 @@
           <a:p>
             <a:fld id="{F9504452-5DCC-4FE2-A5C9-8A5EF6714D65}" type="datetime1">
               <a:rPr lang="en-US" smtClean="0"/>
-              <a:t>9/13/2025</a:t>
+              <a:t>14/9/2025</a:t>
             </a:fld>
             <a:endParaRPr lang="en-US"/>
           </a:p>
@@ -7120,7 +7254,7 @@
           <a:p>
             <a:fld id="{E579ABC2-0180-4F3A-A895-A85BC724D472}" type="datetime1">
               <a:rPr lang="en-US" smtClean="0"/>
-              <a:t>9/13/2025</a:t>
+              <a:t>14/9/2025</a:t>
             </a:fld>
             <a:endParaRPr lang="en-US"/>
           </a:p>
@@ -7538,7 +7672,7 @@
           <a:p>
             <a:fld id="{6AEEA9BA-4E8F-439E-BEA4-91FBA01E3F5F}" type="datetime1">
               <a:rPr lang="en-US" smtClean="0"/>
-              <a:t>9/13/2025</a:t>
+              <a:t>14/9/2025</a:t>
             </a:fld>
             <a:endParaRPr lang="en-US"/>
           </a:p>
@@ -7680,7 +7814,7 @@
           <a:p>
             <a:fld id="{BE15BF18-0007-481C-AA29-413124BC3EE7}" type="datetime1">
               <a:rPr lang="en-US" smtClean="0"/>
-              <a:t>9/13/2025</a:t>
+              <a:t>14/9/2025</a:t>
             </a:fld>
             <a:endParaRPr lang="en-US"/>
           </a:p>
@@ -7842,7 +7976,7 @@
           <a:p>
             <a:fld id="{09BE9870-3748-43AD-B547-02A075CB4A1D}" type="datetime1">
               <a:rPr lang="en-US" smtClean="0"/>
-              <a:t>9/13/2025</a:t>
+              <a:t>14/9/2025</a:t>
             </a:fld>
             <a:endParaRPr lang="en-US"/>
           </a:p>
@@ -8159,7 +8293,7 @@
           <a:p>
             <a:fld id="{558E7897-33C5-4F1A-9307-D068E37F3DC7}" type="datetime1">
               <a:rPr lang="en-US" smtClean="0"/>
-              <a:t>9/13/2025</a:t>
+              <a:t>14/9/2025</a:t>
             </a:fld>
             <a:endParaRPr lang="en-US"/>
           </a:p>
@@ -8454,7 +8588,7 @@
           <a:p>
             <a:fld id="{82E171BA-CC09-47C8-A6DF-F5C5CB59CEEC}" type="datetime1">
               <a:rPr lang="en-US" smtClean="0"/>
-              <a:t>9/13/2025</a:t>
+              <a:t>14/9/2025</a:t>
             </a:fld>
             <a:endParaRPr lang="en-US"/>
           </a:p>
@@ -8695,7 +8829,7 @@
           <a:p>
             <a:fld id="{7DA38F49-B3E2-4BF0-BEC7-C30D34ABBB8D}" type="datetime1">
               <a:rPr lang="en-US" smtClean="0"/>
-              <a:t>9/13/2025</a:t>
+              <a:t>14/9/2025</a:t>
             </a:fld>
             <a:endParaRPr lang="en-US"/>
           </a:p>
@@ -9494,8 +9628,6 @@
               <a:lnSpc>
                 <a:spcPct val="120000"/>
               </a:lnSpc>
-              <a:buFont typeface="Arial" panose="020B0604020202020204" pitchFamily="34" charset="0"/>
-              <a:buChar char="•"/>
             </a:pPr>
             <a:r>
               <a:rPr lang="en-US" dirty="0"/>
@@ -9507,8 +9639,6 @@
               <a:lnSpc>
                 <a:spcPct val="120000"/>
               </a:lnSpc>
-              <a:buFont typeface="Arial" panose="020B0604020202020204" pitchFamily="34" charset="0"/>
-              <a:buChar char="•"/>
             </a:pPr>
             <a:r>
               <a:rPr lang="en-US" dirty="0"/>
@@ -9520,8 +9650,6 @@
               <a:lnSpc>
                 <a:spcPct val="120000"/>
               </a:lnSpc>
-              <a:buFont typeface="Arial" panose="020B0604020202020204" pitchFamily="34" charset="0"/>
-              <a:buChar char="•"/>
             </a:pPr>
             <a:r>
               <a:rPr lang="en-US" dirty="0"/>
@@ -9576,13 +9704,13 @@
   <p:clrMapOvr>
     <a:masterClrMapping/>
   </p:clrMapOvr>
-  <mc:AlternateContent xmlns:mc="http://schemas.openxmlformats.org/markup-compatibility/2006">
-    <mc:Choice xmlns:p14="http://schemas.microsoft.com/office/powerpoint/2010/main" Requires="p14">
+  <mc:AlternateContent xmlns:mc="http://schemas.openxmlformats.org/markup-compatibility/2006" xmlns:p14="http://schemas.microsoft.com/office/powerpoint/2010/main">
+    <mc:Choice Requires="p14">
       <p:transition spd="slow" p14:dur="1500">
         <p:random/>
       </p:transition>
     </mc:Choice>
-    <mc:Fallback>
+    <mc:Fallback xmlns="">
       <p:transition spd="slow">
         <p:random/>
       </p:transition>
@@ -9870,7 +9998,7 @@
             <p:ph idx="1"/>
             <p:extLst>
               <p:ext uri="{D42A27DB-BD31-4B8C-83A1-F6EECF244321}">
-                <p14:modId xmlns:p14="http://schemas.microsoft.com/office/powerpoint/2010/main" val="4111408626"/>
+                <p14:modId xmlns:p14="http://schemas.microsoft.com/office/powerpoint/2010/main" val="2327384840"/>
               </p:ext>
             </p:extLst>
           </p:nvPr>
@@ -9947,13 +10075,13 @@
   <p:clrMapOvr>
     <a:masterClrMapping/>
   </p:clrMapOvr>
-  <mc:AlternateContent xmlns:mc="http://schemas.openxmlformats.org/markup-compatibility/2006">
-    <mc:Choice xmlns:p14="http://schemas.microsoft.com/office/powerpoint/2010/main" Requires="p14">
+  <mc:AlternateContent xmlns:mc="http://schemas.openxmlformats.org/markup-compatibility/2006" xmlns:p14="http://schemas.microsoft.com/office/powerpoint/2010/main">
+    <mc:Choice Requires="p14">
       <p:transition spd="slow" p14:dur="1500">
         <p:random/>
       </p:transition>
     </mc:Choice>
-    <mc:Fallback>
+    <mc:Fallback xmlns="">
       <p:transition spd="slow">
         <p:random/>
       </p:transition>
@@ -10096,7 +10224,12 @@
             <p:ph idx="1"/>
           </p:nvPr>
         </p:nvSpPr>
-        <p:spPr/>
+        <p:spPr>
+          <a:xfrm>
+            <a:off x="640080" y="2633472"/>
+            <a:ext cx="10180320" cy="3566160"/>
+          </a:xfrm>
+        </p:spPr>
         <p:txBody>
           <a:bodyPr>
             <a:normAutofit/>
@@ -10123,19 +10256,19 @@
           <a:p>
             <a:r>
               <a:rPr dirty="0"/>
-              <a:t>Preprocessing: </a:t>
+              <a:t>P</a:t>
             </a:r>
             <a:r>
               <a:rPr lang="en-US" dirty="0"/>
-              <a:t>Frame by frame conversion to pose </a:t>
+              <a:t>reprocessing: Extract pose </a:t>
             </a:r>
             <a:r>
               <a:rPr lang="en-US" dirty="0" err="1"/>
-              <a:t>keypoint</a:t>
+              <a:t>keypoints</a:t>
             </a:r>
             <a:r>
               <a:rPr lang="en-US" dirty="0"/>
-              <a:t> data (body, face and hand positions) through </a:t>
+              <a:t> (body, face, hands) from each frame using </a:t>
             </a:r>
             <a:r>
               <a:rPr lang="en-US" dirty="0" err="1"/>
@@ -10143,7 +10276,7 @@
             </a:r>
             <a:r>
               <a:rPr lang="en-US" dirty="0"/>
-              <a:t>. Normalization of median and deviation. Finally, frame-data stacking.</a:t>
+              <a:t>, normalize (median &amp; deviation), and stack frame data.</a:t>
             </a:r>
           </a:p>
           <a:p>
@@ -10173,13 +10306,13 @@
           <p:nvPr>
             <p:extLst>
               <p:ext uri="{D42A27DB-BD31-4B8C-83A1-F6EECF244321}">
-                <p14:modId xmlns:p14="http://schemas.microsoft.com/office/powerpoint/2010/main" val="1029744781"/>
+                <p14:modId xmlns:p14="http://schemas.microsoft.com/office/powerpoint/2010/main" val="734662095"/>
               </p:ext>
             </p:extLst>
           </p:nvPr>
         </p:nvGraphicFramePr>
         <p:xfrm>
-          <a:off x="1908535" y="3081337"/>
+          <a:off x="1881103" y="2633472"/>
           <a:ext cx="8128000" cy="3613130"/>
         </p:xfrm>
         <a:graphic>
@@ -10193,13 +10326,13 @@
   <p:clrMapOvr>
     <a:masterClrMapping/>
   </p:clrMapOvr>
-  <mc:AlternateContent xmlns:mc="http://schemas.openxmlformats.org/markup-compatibility/2006">
-    <mc:Choice xmlns:p14="http://schemas.microsoft.com/office/powerpoint/2010/main" Requires="p14">
+  <mc:AlternateContent xmlns:mc="http://schemas.openxmlformats.org/markup-compatibility/2006" xmlns:p14="http://schemas.microsoft.com/office/powerpoint/2010/main">
+    <mc:Choice Requires="p14">
       <p:transition spd="slow" p14:dur="1500">
         <p:random/>
       </p:transition>
     </mc:Choice>
-    <mc:Fallback>
+    <mc:Fallback xmlns="">
       <p:transition spd="slow">
         <p:random/>
       </p:transition>
@@ -10423,13 +10556,13 @@
   <p:clrMapOvr>
     <a:masterClrMapping/>
   </p:clrMapOvr>
-  <mc:AlternateContent xmlns:mc="http://schemas.openxmlformats.org/markup-compatibility/2006">
-    <mc:Choice xmlns:p14="http://schemas.microsoft.com/office/powerpoint/2010/main" Requires="p14">
+  <mc:AlternateContent xmlns:mc="http://schemas.openxmlformats.org/markup-compatibility/2006" xmlns:p14="http://schemas.microsoft.com/office/powerpoint/2010/main">
+    <mc:Choice Requires="p14">
       <p:transition spd="slow" p14:dur="1500">
         <p:random/>
       </p:transition>
     </mc:Choice>
-    <mc:Fallback>
+    <mc:Fallback xmlns="">
       <p:transition spd="slow">
         <p:random/>
       </p:transition>
@@ -10670,13 +10803,13 @@
   <p:clrMapOvr>
     <a:masterClrMapping/>
   </p:clrMapOvr>
-  <mc:AlternateContent xmlns:mc="http://schemas.openxmlformats.org/markup-compatibility/2006">
-    <mc:Choice xmlns:p14="http://schemas.microsoft.com/office/powerpoint/2010/main" Requires="p14">
+  <mc:AlternateContent xmlns:mc="http://schemas.openxmlformats.org/markup-compatibility/2006" xmlns:p14="http://schemas.microsoft.com/office/powerpoint/2010/main">
+    <mc:Choice Requires="p14">
       <p:transition spd="slow" p14:dur="1500">
         <p:random/>
       </p:transition>
     </mc:Choice>
-    <mc:Fallback>
+    <mc:Fallback xmlns="">
       <p:transition spd="slow">
         <p:random/>
       </p:transition>
@@ -11032,13 +11165,13 @@
   <p:clrMapOvr>
     <a:masterClrMapping/>
   </p:clrMapOvr>
-  <mc:AlternateContent xmlns:mc="http://schemas.openxmlformats.org/markup-compatibility/2006">
-    <mc:Choice xmlns:p14="http://schemas.microsoft.com/office/powerpoint/2010/main" Requires="p14">
+  <mc:AlternateContent xmlns:mc="http://schemas.openxmlformats.org/markup-compatibility/2006" xmlns:p14="http://schemas.microsoft.com/office/powerpoint/2010/main">
+    <mc:Choice Requires="p14">
       <p:transition spd="slow" p14:dur="1500">
         <p:random/>
       </p:transition>
     </mc:Choice>
-    <mc:Fallback>
+    <mc:Fallback xmlns="">
       <p:transition spd="slow">
         <p:random/>
       </p:transition>
@@ -11256,47 +11389,47 @@
         </p:spPr>
         <p:txBody>
           <a:bodyPr>
-            <a:normAutofit/>
+            <a:normAutofit lnSpcReduction="10000"/>
           </a:bodyPr>
           <a:lstStyle/>
           <a:p>
             <a:r>
-              <a:rPr lang="en-US"/>
+              <a:rPr lang="en-US" dirty="0"/>
               <a:t>Lack of data</a:t>
             </a:r>
           </a:p>
           <a:p>
             <a:pPr lvl="1"/>
             <a:r>
-              <a:rPr lang="en-US"/>
+              <a:rPr lang="en-US" dirty="0"/>
               <a:t>Available public resources did not contain enough samples for each word</a:t>
             </a:r>
           </a:p>
           <a:p>
             <a:pPr lvl="1"/>
             <a:r>
-              <a:rPr lang="en-US"/>
-              <a:t>We tried to focus on a few words with as many samples as we could find but it was still not enough.</a:t>
+              <a:rPr lang="en-US" dirty="0"/>
+              <a:t>We focused on a few words with as many samples as we could find, but the data was still insufficient</a:t>
             </a:r>
           </a:p>
           <a:p>
             <a:pPr lvl="1"/>
             <a:r>
-              <a:rPr lang="en-US"/>
-              <a:t>Personal enrichment efforts are good but insufficient.</a:t>
-            </a:r>
-          </a:p>
-          <a:p>
-            <a:r>
-              <a:rPr lang="en-US"/>
+              <a:rPr lang="en-US" dirty="0"/>
+              <a:t>Personal enrichment efforts helped, but their impact was limited</a:t>
+            </a:r>
+          </a:p>
+          <a:p>
+            <a:r>
+              <a:rPr lang="en-US" dirty="0"/>
               <a:t>Overfitting</a:t>
             </a:r>
           </a:p>
           <a:p>
             <a:pPr lvl="1"/>
             <a:r>
-              <a:rPr lang="en-US"/>
-              <a:t>With this amount of data, there was no option but to overfit.</a:t>
+              <a:rPr lang="en-US" dirty="0"/>
+              <a:t>With this amount of data, overfitting was difficult to avoid</a:t>
             </a:r>
           </a:p>
           <a:p>
@@ -11345,13 +11478,13 @@
   <p:clrMapOvr>
     <a:masterClrMapping/>
   </p:clrMapOvr>
-  <mc:AlternateContent xmlns:mc="http://schemas.openxmlformats.org/markup-compatibility/2006">
-    <mc:Choice xmlns:p14="http://schemas.microsoft.com/office/powerpoint/2010/main" Requires="p14">
+  <mc:AlternateContent xmlns:mc="http://schemas.openxmlformats.org/markup-compatibility/2006" xmlns:p14="http://schemas.microsoft.com/office/powerpoint/2010/main">
+    <mc:Choice Requires="p14">
       <p:transition spd="slow" p14:dur="1500">
         <p:random/>
       </p:transition>
     </mc:Choice>
-    <mc:Fallback>
+    <mc:Fallback xmlns="">
       <p:transition spd="slow">
         <p:random/>
       </p:transition>
@@ -11618,13 +11751,13 @@
   <p:clrMapOvr>
     <a:masterClrMapping/>
   </p:clrMapOvr>
-  <mc:AlternateContent xmlns:mc="http://schemas.openxmlformats.org/markup-compatibility/2006">
-    <mc:Choice xmlns:p14="http://schemas.microsoft.com/office/powerpoint/2010/main" Requires="p14">
+  <mc:AlternateContent xmlns:mc="http://schemas.openxmlformats.org/markup-compatibility/2006" xmlns:p14="http://schemas.microsoft.com/office/powerpoint/2010/main">
+    <mc:Choice Requires="p14">
       <p:transition spd="slow" p14:dur="1500">
         <p:random/>
       </p:transition>
     </mc:Choice>
-    <mc:Fallback>
+    <mc:Fallback xmlns="">
       <p:transition spd="slow">
         <p:random/>
       </p:transition>
@@ -11904,13 +12037,13 @@
   <p:clrMapOvr>
     <a:masterClrMapping/>
   </p:clrMapOvr>
-  <mc:AlternateContent xmlns:mc="http://schemas.openxmlformats.org/markup-compatibility/2006">
-    <mc:Choice xmlns:p14="http://schemas.microsoft.com/office/powerpoint/2010/main" Requires="p14">
+  <mc:AlternateContent xmlns:mc="http://schemas.openxmlformats.org/markup-compatibility/2006" xmlns:p14="http://schemas.microsoft.com/office/powerpoint/2010/main">
+    <mc:Choice Requires="p14">
       <p:transition spd="slow" p14:dur="1500">
         <p:random/>
       </p:transition>
     </mc:Choice>
-    <mc:Fallback>
+    <mc:Fallback xmlns="">
       <p:transition spd="slow">
         <p:random/>
       </p:transition>

</xml_diff>